<commit_message>
Updated PPT with latest changes
</commit_message>
<xml_diff>
--- a/Steganography_AICTE.pptx
+++ b/Steganography_AICTE.pptx
@@ -6413,7 +6413,7 @@
         </p:spPr>
         <p:txBody>
           <a:bodyPr>
-            <a:normAutofit fontScale="85000" lnSpcReduction="20000"/>
+            <a:normAutofit fontScale="85000" lnSpcReduction="10000"/>
           </a:bodyPr>
           <a:lstStyle/>
           <a:p>
@@ -6423,15 +6423,6 @@
                 <a:cs typeface="Arial" panose="020B0604020202020204" pitchFamily="34" charset="0"/>
               </a:rPr>
               <a:t>Repository: </a:t>
-            </a:r>
-          </a:p>
-          <a:p>
-            <a:r>
-              <a:rPr lang="en-US" sz="2600" b="1" dirty="0">
-                <a:latin typeface="Arial" panose="020B0604020202020204" pitchFamily="34" charset="0"/>
-                <a:cs typeface="Arial" panose="020B0604020202020204" pitchFamily="34" charset="0"/>
-              </a:rPr>
-              <a:t>README File : </a:t>
             </a:r>
             <a:r>
               <a:rPr lang="en-US" sz="2600" b="1" dirty="0">
@@ -6439,7 +6430,7 @@
                 <a:cs typeface="Arial" panose="020B0604020202020204" pitchFamily="34" charset="0"/>
                 <a:hlinkClick r:id="rId2"/>
               </a:rPr>
-              <a:t>https://github.com/devilakshmid19/steganography/blob/main/README.md</a:t>
+              <a:t>https://github.com/devilakshmid19/steganography/</a:t>
             </a:r>
             <a:endParaRPr lang="en-US" sz="2600" b="1" dirty="0">
               <a:latin typeface="Arial" panose="020B0604020202020204" pitchFamily="34" charset="0"/>
@@ -6452,7 +6443,7 @@
                 <a:latin typeface="Arial" panose="020B0604020202020204" pitchFamily="34" charset="0"/>
                 <a:cs typeface="Arial" panose="020B0604020202020204" pitchFamily="34" charset="0"/>
               </a:rPr>
-              <a:t>Live Project : </a:t>
+              <a:t>README File : </a:t>
             </a:r>
             <a:r>
               <a:rPr lang="en-US" sz="2600" b="1" dirty="0">
@@ -6460,7 +6451,7 @@
                 <a:cs typeface="Arial" panose="020B0604020202020204" pitchFamily="34" charset="0"/>
                 <a:hlinkClick r:id="rId3"/>
               </a:rPr>
-              <a:t>https://steganography-7dvxmx9kaewhhsh7c3aayn.streamlit.app/</a:t>
+              <a:t>https://github.com/devilakshmid19/steganography/blob/main/README.md</a:t>
             </a:r>
             <a:endParaRPr lang="en-US" sz="2600" b="1" dirty="0">
               <a:latin typeface="Arial" panose="020B0604020202020204" pitchFamily="34" charset="0"/>
@@ -6468,10 +6459,22 @@
             </a:endParaRPr>
           </a:p>
           <a:p>
-            <a:pPr marL="0" indent="0">
-              <a:buNone/>
-            </a:pPr>
-            <a:endParaRPr lang="en-US" sz="2000" b="1" dirty="0">
+            <a:r>
+              <a:rPr lang="en-US" sz="2600" b="1" dirty="0">
+                <a:latin typeface="Arial" panose="020B0604020202020204" pitchFamily="34" charset="0"/>
+                <a:cs typeface="Arial" panose="020B0604020202020204" pitchFamily="34" charset="0"/>
+              </a:rPr>
+              <a:t>Live Project : </a:t>
+            </a:r>
+            <a:r>
+              <a:rPr lang="en-US" sz="2600" b="1" dirty="0">
+                <a:latin typeface="Arial" panose="020B0604020202020204" pitchFamily="34" charset="0"/>
+                <a:cs typeface="Arial" panose="020B0604020202020204" pitchFamily="34" charset="0"/>
+                <a:hlinkClick r:id="rId4"/>
+              </a:rPr>
+              <a:t>https://devilakshmid19.github.io/steganography/</a:t>
+            </a:r>
+            <a:endParaRPr lang="en-US" sz="2600" b="1" dirty="0">
               <a:latin typeface="Arial" panose="020B0604020202020204" pitchFamily="34" charset="0"/>
               <a:cs typeface="Arial" panose="020B0604020202020204" pitchFamily="34" charset="0"/>
             </a:endParaRPr>
@@ -7071,6 +7074,23 @@
 </file>
 
 <file path=customXml/item1.xml><?xml version="1.0" encoding="utf-8"?>
+<p:properties xmlns:p="http://schemas.microsoft.com/office/2006/metadata/properties" xmlns:xsi="http://www.w3.org/2001/XMLSchema-instance" xmlns:pc="http://schemas.microsoft.com/office/infopath/2007/PartnerControls">
+  <documentManagement>
+    <_activity xmlns="b30265f8-c5e2-4918-b4a1-b977299ca3e2" xsi:nil="true"/>
+  </documentManagement>
+</p:properties>
+</file>
+
+<file path=customXml/item2.xml><?xml version="1.0" encoding="utf-8"?>
+<?mso-contentType ?>
+<FormTemplates xmlns="http://schemas.microsoft.com/sharepoint/v3/contenttype/forms">
+  <Display>DocumentLibraryForm</Display>
+  <Edit>DocumentLibraryForm</Edit>
+  <New>DocumentLibraryForm</New>
+</FormTemplates>
+</file>
+
+<file path=customXml/item3.xml><?xml version="1.0" encoding="utf-8"?>
 <ct:contentTypeSchema xmlns:ct="http://schemas.microsoft.com/office/2006/metadata/contentType" xmlns:ma="http://schemas.microsoft.com/office/2006/metadata/properties/metaAttributes" ct:_="" ma:_="" ma:contentTypeName="Document" ma:contentTypeID="0x0101007F0268AC5E70984D8FE60B7154176407" ma:contentTypeVersion="15" ma:contentTypeDescription="Create a new document." ma:contentTypeScope="" ma:versionID="104e359103f0f57b1cf9676756e5b944">
   <xsd:schema xmlns:xsd="http://www.w3.org/2001/XMLSchema" xmlns:xs="http://www.w3.org/2001/XMLSchema" xmlns:p="http://schemas.microsoft.com/office/2006/metadata/properties" xmlns:ns3="b30265f8-c5e2-4918-b4a1-b977299ca3e2" xmlns:ns4="fadb41d3-f9cb-40fb-903c-8cacaba95bb5" targetNamespace="http://schemas.microsoft.com/office/2006/metadata/properties" ma:root="true" ma:fieldsID="5615b8f8aa772998bad551f24a33de0e" ns3:_="" ns4:_="">
     <xsd:import namespace="b30265f8-c5e2-4918-b4a1-b977299ca3e2"/>
@@ -7303,24 +7323,32 @@
 </ct:contentTypeSchema>
 </file>
 
-<file path=customXml/item2.xml><?xml version="1.0" encoding="utf-8"?>
-<?mso-contentType ?>
-<FormTemplates xmlns="http://schemas.microsoft.com/sharepoint/v3/contenttype/forms">
-  <Display>DocumentLibraryForm</Display>
-  <Edit>DocumentLibraryForm</Edit>
-  <New>DocumentLibraryForm</New>
-</FormTemplates>
+<file path=customXml/itemProps1.xml><?xml version="1.0" encoding="utf-8"?>
+<ds:datastoreItem xmlns:ds="http://schemas.openxmlformats.org/officeDocument/2006/customXml" ds:itemID="{8D289AE2-D2AE-49D1-AFAC-3A79F6794255}">
+  <ds:schemaRefs>
+    <ds:schemaRef ds:uri="http://purl.org/dc/terms/"/>
+    <ds:schemaRef ds:uri="http://purl.org/dc/elements/1.1/"/>
+    <ds:schemaRef ds:uri="http://schemas.microsoft.com/office/infopath/2007/PartnerControls"/>
+    <ds:schemaRef ds:uri="http://schemas.microsoft.com/office/2006/metadata/properties"/>
+    <ds:schemaRef ds:uri="http://schemas.microsoft.com/office/2006/documentManagement/types"/>
+    <ds:schemaRef ds:uri="http://schemas.openxmlformats.org/package/2006/metadata/core-properties"/>
+    <ds:schemaRef ds:uri="http://purl.org/dc/dcmitype/"/>
+    <ds:schemaRef ds:uri="http://www.w3.org/XML/1998/namespace"/>
+    <ds:schemaRef ds:uri="fadb41d3-f9cb-40fb-903c-8cacaba95bb5"/>
+    <ds:schemaRef ds:uri="b30265f8-c5e2-4918-b4a1-b977299ca3e2"/>
+  </ds:schemaRefs>
+</ds:datastoreItem>
 </file>
 
-<file path=customXml/item3.xml><?xml version="1.0" encoding="utf-8"?>
-<p:properties xmlns:p="http://schemas.microsoft.com/office/2006/metadata/properties" xmlns:xsi="http://www.w3.org/2001/XMLSchema-instance" xmlns:pc="http://schemas.microsoft.com/office/infopath/2007/PartnerControls">
-  <documentManagement>
-    <_activity xmlns="b30265f8-c5e2-4918-b4a1-b977299ca3e2" xsi:nil="true"/>
-  </documentManagement>
-</p:properties>
+<file path=customXml/itemProps2.xml><?xml version="1.0" encoding="utf-8"?>
+<ds:datastoreItem xmlns:ds="http://schemas.openxmlformats.org/officeDocument/2006/customXml" ds:itemID="{927BD4C1-B6B1-4715-ABF9-E660A51A4EA0}">
+  <ds:schemaRefs>
+    <ds:schemaRef ds:uri="http://schemas.microsoft.com/sharepoint/v3/contenttype/forms"/>
+  </ds:schemaRefs>
+</ds:datastoreItem>
 </file>
 
-<file path=customXml/itemProps1.xml><?xml version="1.0" encoding="utf-8"?>
+<file path=customXml/itemProps3.xml><?xml version="1.0" encoding="utf-8"?>
 <ds:datastoreItem xmlns:ds="http://schemas.openxmlformats.org/officeDocument/2006/customXml" ds:itemID="{9DD71778-17EE-4151-88AE-C8F4E8043BD9}">
   <ds:schemaRefs>
     <ds:schemaRef ds:uri="http://schemas.microsoft.com/office/2006/metadata/contentType"/>
@@ -7337,29 +7365,4 @@
     <ds:schemaRef ds:uri="http://schemas.microsoft.com/internal/obd"/>
   </ds:schemaRefs>
 </ds:datastoreItem>
-</file>
-
-<file path=customXml/itemProps2.xml><?xml version="1.0" encoding="utf-8"?>
-<ds:datastoreItem xmlns:ds="http://schemas.openxmlformats.org/officeDocument/2006/customXml" ds:itemID="{927BD4C1-B6B1-4715-ABF9-E660A51A4EA0}">
-  <ds:schemaRefs>
-    <ds:schemaRef ds:uri="http://schemas.microsoft.com/sharepoint/v3/contenttype/forms"/>
-  </ds:schemaRefs>
-</ds:datastoreItem>
-</file>
-
-<file path=customXml/itemProps3.xml><?xml version="1.0" encoding="utf-8"?>
-<ds:datastoreItem xmlns:ds="http://schemas.openxmlformats.org/officeDocument/2006/customXml" ds:itemID="{8D289AE2-D2AE-49D1-AFAC-3A79F6794255}">
-  <ds:schemaRefs>
-    <ds:schemaRef ds:uri="http://purl.org/dc/terms/"/>
-    <ds:schemaRef ds:uri="http://purl.org/dc/elements/1.1/"/>
-    <ds:schemaRef ds:uri="http://schemas.microsoft.com/office/infopath/2007/PartnerControls"/>
-    <ds:schemaRef ds:uri="http://schemas.microsoft.com/office/2006/metadata/properties"/>
-    <ds:schemaRef ds:uri="http://schemas.microsoft.com/office/2006/documentManagement/types"/>
-    <ds:schemaRef ds:uri="http://schemas.openxmlformats.org/package/2006/metadata/core-properties"/>
-    <ds:schemaRef ds:uri="http://purl.org/dc/dcmitype/"/>
-    <ds:schemaRef ds:uri="http://www.w3.org/XML/1998/namespace"/>
-    <ds:schemaRef ds:uri="fadb41d3-f9cb-40fb-903c-8cacaba95bb5"/>
-    <ds:schemaRef ds:uri="b30265f8-c5e2-4918-b4a1-b977299ca3e2"/>
-  </ds:schemaRefs>
-</ds:datastoreItem>
 </file>
</xml_diff>